<commit_message>
Update 3d model content
</commit_message>
<xml_diff>
--- a/PPT/캡스톤디자인_5주차 발표자료_5조.pptx
+++ b/PPT/캡스톤디자인_5주차 발표자료_5조.pptx
@@ -5,7 +5,7 @@
     <p:sldMasterId id="2147483648" r:id="rId1"/>
   </p:sldMasterIdLst>
   <p:notesMasterIdLst>
-    <p:notesMasterId r:id="rId20"/>
+    <p:notesMasterId r:id="rId19"/>
   </p:notesMasterIdLst>
   <p:sldIdLst>
     <p:sldId id="256" r:id="rId2"/>
@@ -23,17 +23,20 @@
     <p:sldId id="267" r:id="rId14"/>
     <p:sldId id="268" r:id="rId15"/>
     <p:sldId id="278" r:id="rId16"/>
-    <p:sldId id="279" r:id="rId17"/>
-    <p:sldId id="280" r:id="rId18"/>
-    <p:sldId id="271" r:id="rId19"/>
+    <p:sldId id="280" r:id="rId17"/>
+    <p:sldId id="271" r:id="rId18"/>
   </p:sldIdLst>
   <p:sldSz cx="24384000" cy="13716000"/>
   <p:notesSz cx="6858000" cy="9144000"/>
   <p:embeddedFontLst>
     <p:embeddedFont>
       <p:font typeface="맑은 고딕" panose="020B0503020000020004" pitchFamily="50" charset="-127"/>
-      <p:regular r:id="rId21"/>
-      <p:bold r:id="rId22"/>
+      <p:regular r:id="rId20"/>
+      <p:bold r:id="rId21"/>
+    </p:embeddedFont>
+    <p:embeddedFont>
+      <p:font typeface="나눔스퀘어" panose="020B0600000101010101" pitchFamily="50" charset="-127"/>
+      <p:regular r:id="rId22"/>
     </p:embeddedFont>
   </p:embeddedFontLst>
   <p:defaultTextStyle>
@@ -535,7 +538,7 @@
           </ac:spMkLst>
         </pc:spChg>
         <pc:picChg chg="add del mod modCrop">
-          <ac:chgData name="남유선" userId="c5c0474d-318a-4504-b270-99912c9aca2f" providerId="ADAL" clId="{BA1A3491-B082-4EEC-A66C-E734D0834DE4}" dt="2018-10-01T17:09:47.256" v="183"/>
+          <ac:chgData name="남유선" userId="c5c0474d-318a-4504-b270-99912c9aca2f" providerId="ADAL" clId="{BA1A3491-B082-4EEC-A66C-E734D0834DE4}" dt="2018-10-01T17:09:47.256" v="183" actId="14100"/>
           <ac:picMkLst>
             <pc:docMk/>
             <pc:sldMk cId="2723061311" sldId="279"/>
@@ -551,7 +554,7 @@
           </ac:picMkLst>
         </pc:picChg>
         <pc:picChg chg="add del mod modCrop">
-          <ac:chgData name="남유선" userId="c5c0474d-318a-4504-b270-99912c9aca2f" providerId="ADAL" clId="{BA1A3491-B082-4EEC-A66C-E734D0834DE4}" dt="2018-10-01T17:10:18.300" v="191"/>
+          <ac:chgData name="남유선" userId="c5c0474d-318a-4504-b270-99912c9aca2f" providerId="ADAL" clId="{BA1A3491-B082-4EEC-A66C-E734D0834DE4}" dt="2018-10-01T17:10:18.300" v="191" actId="14100"/>
           <ac:picMkLst>
             <pc:docMk/>
             <pc:sldMk cId="2723061311" sldId="279"/>
@@ -1246,6 +1249,30 @@
           <a:bodyPr/>
           <a:lstStyle/>
           <a:p>
+            <a:pPr marL="0" indent="0">
+              <a:buNone/>
+            </a:pPr>
+            <a:r>
+              <a:rPr lang="ko-KR" altLang="en-US" dirty="0"/>
+              <a:t>치아 </a:t>
+            </a:r>
+            <a:r>
+              <a:rPr lang="en-US" altLang="ko-KR" dirty="0"/>
+              <a:t>3d</a:t>
+            </a:r>
+            <a:r>
+              <a:rPr lang="ko-KR" altLang="en-US" dirty="0"/>
+              <a:t>모델 검색 후 삽입</a:t>
+            </a:r>
+            <a:endParaRPr lang="en-US" altLang="ko-KR" dirty="0"/>
+          </a:p>
+          <a:p>
+            <a:pPr marL="0" indent="0">
+              <a:buNone/>
+            </a:pPr>
+            <a:endParaRPr lang="en-US" altLang="ko-KR" dirty="0"/>
+          </a:p>
+          <a:p>
             <a:pPr marL="457200" indent="-457200">
               <a:buAutoNum type="arabicPeriod"/>
             </a:pPr>
@@ -1321,93 +1348,6 @@
               <a:rPr lang="ko-KR" altLang="en-US" dirty="0" err="1"/>
               <a:t>사용해바써</a:t>
             </a:r>
-            <a:endParaRPr lang="en-US" altLang="ko-KR" dirty="0"/>
-          </a:p>
-        </p:txBody>
-      </p:sp>
-    </p:spTree>
-    <p:extLst>
-      <p:ext uri="{BB962C8B-B14F-4D97-AF65-F5344CB8AC3E}">
-        <p14:creationId xmlns:p14="http://schemas.microsoft.com/office/powerpoint/2010/main" val="1490653552"/>
-      </p:ext>
-    </p:extLst>
-  </p:cSld>
-  <p:clrMapOvr>
-    <a:masterClrMapping/>
-  </p:clrMapOvr>
-</p:notes>
-</file>
-
-<file path=ppt/notesSlides/notesSlide7.xml><?xml version="1.0" encoding="utf-8"?>
-<p:notes xmlns:a="http://schemas.openxmlformats.org/drawingml/2006/main" xmlns:r="http://schemas.openxmlformats.org/officeDocument/2006/relationships" xmlns:p="http://schemas.openxmlformats.org/presentationml/2006/main">
-  <p:cSld>
-    <p:spTree>
-      <p:nvGrpSpPr>
-        <p:cNvPr id="1" name=""/>
-        <p:cNvGrpSpPr/>
-        <p:nvPr/>
-      </p:nvGrpSpPr>
-      <p:grpSpPr>
-        <a:xfrm>
-          <a:off x="0" y="0"/>
-          <a:ext cx="0" cy="0"/>
-          <a:chOff x="0" y="0"/>
-          <a:chExt cx="0" cy="0"/>
-        </a:xfrm>
-      </p:grpSpPr>
-      <p:sp>
-        <p:nvSpPr>
-          <p:cNvPr id="2" name="슬라이드 이미지 개체 틀 1"/>
-          <p:cNvSpPr>
-            <a:spLocks noGrp="1" noRot="1" noChangeAspect="1"/>
-          </p:cNvSpPr>
-          <p:nvPr>
-            <p:ph type="sldImg"/>
-          </p:nvPr>
-        </p:nvSpPr>
-        <p:spPr>
-          <a:xfrm>
-            <a:off x="381000" y="685800"/>
-            <a:ext cx="6096000" cy="3429000"/>
-          </a:xfrm>
-        </p:spPr>
-      </p:sp>
-      <p:sp>
-        <p:nvSpPr>
-          <p:cNvPr id="3" name="슬라이드 노트 개체 틀 2"/>
-          <p:cNvSpPr>
-            <a:spLocks noGrp="1"/>
-          </p:cNvSpPr>
-          <p:nvPr>
-            <p:ph type="body" idx="1"/>
-          </p:nvPr>
-        </p:nvSpPr>
-        <p:spPr/>
-        <p:txBody>
-          <a:bodyPr/>
-          <a:lstStyle/>
-          <a:p>
-            <a:pPr marL="0" indent="0">
-              <a:buNone/>
-            </a:pPr>
-            <a:r>
-              <a:rPr lang="ko-KR" altLang="en-US" dirty="0"/>
-              <a:t>치아 </a:t>
-            </a:r>
-            <a:r>
-              <a:rPr lang="en-US" altLang="ko-KR" dirty="0"/>
-              <a:t>3d</a:t>
-            </a:r>
-            <a:r>
-              <a:rPr lang="ko-KR" altLang="en-US" dirty="0"/>
-              <a:t>모델 검색 후 삽입</a:t>
-            </a:r>
-            <a:endParaRPr lang="en-US" altLang="ko-KR" dirty="0"/>
-          </a:p>
-          <a:p>
-            <a:pPr marL="0" indent="0">
-              <a:buNone/>
-            </a:pPr>
             <a:endParaRPr lang="en-US" altLang="ko-KR" dirty="0"/>
           </a:p>
           <a:p>
@@ -3936,7 +3876,7 @@
           </a:ln>
           <a:extLst>
             <a:ext uri="{C572A759-6A51-4108-AA02-DFA0A04FC94B}">
-              <ma14:wrappingTextBoxFlag xmlns="" xmlns:m="http://schemas.openxmlformats.org/officeDocument/2006/math" xmlns:a14="http://schemas.microsoft.com/office/drawing/2010/main" xmlns:ma14="http://schemas.microsoft.com/office/mac/drawingml/2011/main" val="1"/>
+              <ma14:wrappingTextBoxFlag xmlns:ma14="http://schemas.microsoft.com/office/mac/drawingml/2011/main" xmlns:a14="http://schemas.microsoft.com/office/drawing/2010/main" xmlns:m="http://schemas.openxmlformats.org/officeDocument/2006/math" xmlns="" val="1"/>
             </a:ext>
           </a:extLst>
         </p:spPr>
@@ -3975,7 +3915,7 @@
           </a:ln>
           <a:extLst>
             <a:ext uri="{C572A759-6A51-4108-AA02-DFA0A04FC94B}">
-              <ma14:wrappingTextBoxFlag xmlns="" xmlns:m="http://schemas.openxmlformats.org/officeDocument/2006/math" xmlns:a14="http://schemas.microsoft.com/office/drawing/2010/main" xmlns:ma14="http://schemas.microsoft.com/office/mac/drawingml/2011/main" val="1"/>
+              <ma14:wrappingTextBoxFlag xmlns:ma14="http://schemas.microsoft.com/office/mac/drawingml/2011/main" xmlns:a14="http://schemas.microsoft.com/office/drawing/2010/main" xmlns:m="http://schemas.openxmlformats.org/officeDocument/2006/math" xmlns="" val="1"/>
             </a:ext>
           </a:extLst>
         </p:spPr>
@@ -4919,7 +4859,7 @@
         </p:spPr>
         <p:txBody>
           <a:bodyPr>
-            <a:normAutofit fontScale="90000"/>
+            <a:normAutofit/>
           </a:bodyPr>
           <a:lstStyle/>
           <a:p>
@@ -8190,265 +8130,6 @@
       </p:grpSpPr>
       <p:sp>
         <p:nvSpPr>
-          <p:cNvPr id="146" name="홈 헬스케어 제품 시장의 성장"/>
-          <p:cNvSpPr txBox="1">
-            <a:spLocks noGrp="1"/>
-          </p:cNvSpPr>
-          <p:nvPr>
-            <p:ph type="title"/>
-          </p:nvPr>
-        </p:nvSpPr>
-        <p:spPr>
-          <a:prstGeom prst="rect">
-            <a:avLst/>
-          </a:prstGeom>
-        </p:spPr>
-        <p:txBody>
-          <a:bodyPr/>
-          <a:lstStyle>
-            <a:lvl1pPr defTabSz="747593">
-              <a:defRPr sz="10192"/>
-            </a:lvl1pPr>
-          </a:lstStyle>
-          <a:p>
-            <a:r>
-              <a:rPr lang="en-US" altLang="ko-KR" dirty="0">
-                <a:latin typeface="나눔스퀘어" panose="020B0600000101010101" pitchFamily="50" charset="-127"/>
-                <a:ea typeface="나눔스퀘어" panose="020B0600000101010101" pitchFamily="50" charset="-127"/>
-              </a:rPr>
-              <a:t>3</a:t>
-            </a:r>
-            <a:r>
-              <a:rPr lang="en-US" altLang="ko-KR" dirty="0"/>
-              <a:t>D</a:t>
-            </a:r>
-            <a:r>
-              <a:rPr lang="ko-KR" altLang="en-US" dirty="0"/>
-              <a:t> </a:t>
-            </a:r>
-            <a:r>
-              <a:rPr lang="en-US" altLang="ko-KR" dirty="0"/>
-              <a:t>Model</a:t>
-            </a:r>
-            <a:endParaRPr dirty="0">
-              <a:latin typeface="나눔스퀘어" panose="020B0600000101010101" pitchFamily="50" charset="-127"/>
-              <a:ea typeface="나눔스퀘어" panose="020B0600000101010101" pitchFamily="50" charset="-127"/>
-            </a:endParaRPr>
-          </a:p>
-        </p:txBody>
-      </p:sp>
-      <p:sp>
-        <p:nvSpPr>
-          <p:cNvPr id="10" name="다양한 스마트 헬스케어 제품 출시…">
-            <a:extLst>
-              <a:ext uri="{FF2B5EF4-FFF2-40B4-BE49-F238E27FC236}">
-                <a16:creationId xmlns:a16="http://schemas.microsoft.com/office/drawing/2014/main" id="{04482910-DE31-4A29-93CD-EA02BA2CE8D0}"/>
-              </a:ext>
-            </a:extLst>
-          </p:cNvPr>
-          <p:cNvSpPr txBox="1">
-            <a:spLocks noGrp="1"/>
-          </p:cNvSpPr>
-          <p:nvPr>
-            <p:ph type="body" sz="half" idx="1"/>
-          </p:nvPr>
-        </p:nvSpPr>
-        <p:spPr>
-          <a:xfrm>
-            <a:off x="4387452" y="3797942"/>
-            <a:ext cx="12663419" cy="7228645"/>
-          </a:xfrm>
-          <a:prstGeom prst="rect">
-            <a:avLst/>
-          </a:prstGeom>
-        </p:spPr>
-        <p:txBody>
-          <a:bodyPr>
-            <a:normAutofit/>
-          </a:bodyPr>
-          <a:lstStyle/>
-          <a:p>
-            <a:pPr marL="722312" indent="-722312">
-              <a:buSzPct val="50000"/>
-              <a:buBlip>
-                <a:blip r:embed="rId3"/>
-              </a:buBlip>
-            </a:pPr>
-            <a:r>
-              <a:rPr lang="en-US" altLang="ko-KR" dirty="0">
-                <a:latin typeface="나눔스퀘어" panose="020B0600000101010101" pitchFamily="50" charset="-127"/>
-                <a:ea typeface="나눔스퀘어" panose="020B0600000101010101" pitchFamily="50" charset="-127"/>
-              </a:rPr>
-              <a:t>Open GL </a:t>
-            </a:r>
-            <a:r>
-              <a:rPr lang="ko-KR" altLang="en-US" dirty="0">
-                <a:latin typeface="나눔스퀘어" panose="020B0600000101010101" pitchFamily="50" charset="-127"/>
-                <a:ea typeface="나눔스퀘어" panose="020B0600000101010101" pitchFamily="50" charset="-127"/>
-              </a:rPr>
-              <a:t>공부</a:t>
-            </a:r>
-            <a:r>
-              <a:rPr lang="en-US" altLang="ko-KR" dirty="0">
-                <a:latin typeface="나눔스퀘어" panose="020B0600000101010101" pitchFamily="50" charset="-127"/>
-                <a:ea typeface="나눔스퀘어" panose="020B0600000101010101" pitchFamily="50" charset="-127"/>
-              </a:rPr>
-              <a:t>?</a:t>
-            </a:r>
-            <a:r>
-              <a:rPr lang="ko-KR" altLang="en-US" dirty="0">
-                <a:latin typeface="나눔스퀘어" panose="020B0600000101010101" pitchFamily="50" charset="-127"/>
-                <a:ea typeface="나눔스퀘어" panose="020B0600000101010101" pitchFamily="50" charset="-127"/>
-              </a:rPr>
-              <a:t>조사</a:t>
-            </a:r>
-            <a:r>
-              <a:rPr lang="en-US" altLang="ko-KR" dirty="0">
-                <a:latin typeface="나눔스퀘어" panose="020B0600000101010101" pitchFamily="50" charset="-127"/>
-                <a:ea typeface="나눔스퀘어" panose="020B0600000101010101" pitchFamily="50" charset="-127"/>
-              </a:rPr>
-              <a:t>?</a:t>
-            </a:r>
-            <a:r>
-              <a:rPr lang="ko-KR" altLang="en-US" dirty="0">
-                <a:latin typeface="나눔스퀘어" panose="020B0600000101010101" pitchFamily="50" charset="-127"/>
-                <a:ea typeface="나눔스퀘어" panose="020B0600000101010101" pitchFamily="50" charset="-127"/>
-              </a:rPr>
-              <a:t>연구</a:t>
-            </a:r>
-            <a:r>
-              <a:rPr lang="en-US" altLang="ko-KR" dirty="0">
-                <a:latin typeface="나눔스퀘어" panose="020B0600000101010101" pitchFamily="50" charset="-127"/>
-                <a:ea typeface="나눔스퀘어" panose="020B0600000101010101" pitchFamily="50" charset="-127"/>
-              </a:rPr>
-              <a:t>?</a:t>
-            </a:r>
-          </a:p>
-          <a:p>
-            <a:pPr marL="722312" indent="-722312">
-              <a:buSzPct val="50000"/>
-              <a:buBlip>
-                <a:blip r:embed="rId3"/>
-              </a:buBlip>
-            </a:pPr>
-            <a:r>
-              <a:rPr lang="ko-KR" altLang="en-US" dirty="0">
-                <a:latin typeface="나눔스퀘어" panose="020B0600000101010101" pitchFamily="50" charset="-127"/>
-                <a:ea typeface="나눔스퀘어" panose="020B0600000101010101" pitchFamily="50" charset="-127"/>
-              </a:rPr>
-              <a:t>안드로이드 스튜디오에 있는 </a:t>
-            </a:r>
-            <a:r>
-              <a:rPr lang="en-US" altLang="ko-KR" dirty="0">
-                <a:latin typeface="나눔스퀘어" panose="020B0600000101010101" pitchFamily="50" charset="-127"/>
-                <a:ea typeface="나눔스퀘어" panose="020B0600000101010101" pitchFamily="50" charset="-127"/>
-              </a:rPr>
-              <a:t>Open GL</a:t>
-            </a:r>
-          </a:p>
-          <a:p>
-            <a:pPr marL="0" indent="0">
-              <a:buSzPct val="50000"/>
-              <a:buNone/>
-            </a:pPr>
-            <a:r>
-              <a:rPr lang="en-US" altLang="ko-KR" dirty="0">
-                <a:latin typeface="나눔스퀘어" panose="020B0600000101010101" pitchFamily="50" charset="-127"/>
-                <a:ea typeface="나눔스퀘어" panose="020B0600000101010101" pitchFamily="50" charset="-127"/>
-              </a:rPr>
-              <a:t>	</a:t>
-            </a:r>
-            <a:r>
-              <a:rPr lang="ko-KR" altLang="en-US" dirty="0">
-                <a:latin typeface="나눔스퀘어" panose="020B0600000101010101" pitchFamily="50" charset="-127"/>
-                <a:ea typeface="나눔스퀘어" panose="020B0600000101010101" pitchFamily="50" charset="-127"/>
-              </a:rPr>
-              <a:t>라이브러리 사용하여 연습</a:t>
-            </a:r>
-            <a:endParaRPr dirty="0">
-              <a:latin typeface="나눔스퀘어" panose="020B0600000101010101" pitchFamily="50" charset="-127"/>
-              <a:ea typeface="나눔스퀘어" panose="020B0600000101010101" pitchFamily="50" charset="-127"/>
-            </a:endParaRPr>
-          </a:p>
-        </p:txBody>
-      </p:sp>
-      <p:pic>
-        <p:nvPicPr>
-          <p:cNvPr id="12" name="그림 11">
-            <a:extLst>
-              <a:ext uri="{FF2B5EF4-FFF2-40B4-BE49-F238E27FC236}">
-                <a16:creationId xmlns:a16="http://schemas.microsoft.com/office/drawing/2014/main" id="{63009B86-064A-45F5-BF36-C2895AE926A9}"/>
-              </a:ext>
-            </a:extLst>
-          </p:cNvPr>
-          <p:cNvPicPr>
-            <a:picLocks noChangeAspect="1"/>
-          </p:cNvPicPr>
-          <p:nvPr/>
-        </p:nvPicPr>
-        <p:blipFill>
-          <a:blip r:embed="rId4">
-            <a:extLst>
-              <a:ext uri="{28A0092B-C50C-407E-A947-70E740481C1C}">
-                <a14:useLocalDpi xmlns:a14="http://schemas.microsoft.com/office/drawing/2010/main" val="0"/>
-              </a:ext>
-            </a:extLst>
-          </a:blip>
-          <a:stretch>
-            <a:fillRect/>
-          </a:stretch>
-        </p:blipFill>
-        <p:spPr>
-          <a:xfrm>
-            <a:off x="18125181" y="3561972"/>
-            <a:ext cx="4361209" cy="8964706"/>
-          </a:xfrm>
-          <a:prstGeom prst="rect">
-            <a:avLst/>
-          </a:prstGeom>
-          <a:ln>
-            <a:solidFill>
-              <a:schemeClr val="tx1">
-                <a:lumMod val="65000"/>
-                <a:lumOff val="35000"/>
-              </a:schemeClr>
-            </a:solidFill>
-          </a:ln>
-        </p:spPr>
-      </p:pic>
-    </p:spTree>
-    <p:extLst>
-      <p:ext uri="{BB962C8B-B14F-4D97-AF65-F5344CB8AC3E}">
-        <p14:creationId xmlns:p14="http://schemas.microsoft.com/office/powerpoint/2010/main" val="2723061311"/>
-      </p:ext>
-    </p:extLst>
-  </p:cSld>
-  <p:clrMapOvr>
-    <a:masterClrMapping/>
-  </p:clrMapOvr>
-  <p:transition spd="med"/>
-</p:sld>
-</file>
-
-<file path=ppt/slides/slide17.xml><?xml version="1.0" encoding="utf-8"?>
-<p:sld xmlns:a="http://schemas.openxmlformats.org/drawingml/2006/main" xmlns:r="http://schemas.openxmlformats.org/officeDocument/2006/relationships" xmlns:p="http://schemas.openxmlformats.org/presentationml/2006/main">
-  <p:cSld>
-    <p:spTree>
-      <p:nvGrpSpPr>
-        <p:cNvPr id="1" name=""/>
-        <p:cNvGrpSpPr/>
-        <p:nvPr/>
-      </p:nvGrpSpPr>
-      <p:grpSpPr>
-        <a:xfrm>
-          <a:off x="0" y="0"/>
-          <a:ext cx="0" cy="0"/>
-          <a:chOff x="0" y="0"/>
-          <a:chExt cx="0" cy="0"/>
-        </a:xfrm>
-      </p:grpSpPr>
-      <p:sp>
-        <p:nvSpPr>
           <p:cNvPr id="4" name="홈 헬스케어 제품 시장의 성장">
             <a:extLst>
               <a:ext uri="{FF2B5EF4-FFF2-40B4-BE49-F238E27FC236}">
@@ -8602,41 +8283,307 @@
       </p:pic>
       <p:sp>
         <p:nvSpPr>
-          <p:cNvPr id="9" name="다양한 스마트 헬스케어 제품 출시…">
+          <p:cNvPr id="7" name="다양한 스마트 헬스케어 제품 출시…">
             <a:extLst>
               <a:ext uri="{FF2B5EF4-FFF2-40B4-BE49-F238E27FC236}">
-                <a16:creationId xmlns:a16="http://schemas.microsoft.com/office/drawing/2014/main" id="{AEEB9307-03C6-4FEF-883B-156A5CF307FC}"/>
+                <a16:creationId xmlns:a16="http://schemas.microsoft.com/office/drawing/2014/main" id="{E23056D9-4733-47E1-8799-D37BDF024A6F}"/>
               </a:ext>
             </a:extLst>
           </p:cNvPr>
           <p:cNvSpPr txBox="1">
-            <a:spLocks noGrp="1"/>
+            <a:spLocks/>
           </p:cNvSpPr>
-          <p:nvPr>
-            <p:ph type="body" sz="half" idx="1"/>
-          </p:nvPr>
+          <p:nvPr/>
         </p:nvSpPr>
         <p:spPr>
           <a:xfrm>
-            <a:off x="7034668" y="4299966"/>
-            <a:ext cx="10314666" cy="7228645"/>
+            <a:off x="7367904" y="3643312"/>
+            <a:ext cx="15609094" cy="7666371"/>
           </a:xfrm>
           <a:prstGeom prst="rect">
             <a:avLst/>
           </a:prstGeom>
+          <a:ln w="12700">
+            <a:miter lim="400000"/>
+          </a:ln>
+          <a:extLst>
+            <a:ext uri="{C572A759-6A51-4108-AA02-DFA0A04FC94B}">
+              <ma14:wrappingTextBoxFlag xmlns:ma14="http://schemas.microsoft.com/office/mac/drawingml/2011/main" xmlns:a14="http://schemas.microsoft.com/office/drawing/2010/main" xmlns:m="http://schemas.openxmlformats.org/officeDocument/2006/math" xmlns="" val="1"/>
+            </a:ext>
+          </a:extLst>
         </p:spPr>
         <p:txBody>
-          <a:bodyPr>
-            <a:normAutofit lnSpcReduction="10000"/>
+          <a:bodyPr lIns="71437" tIns="71437" rIns="71437" bIns="71437" anchor="ctr">
+            <a:normAutofit/>
           </a:bodyPr>
-          <a:lstStyle/>
-          <a:p>
-            <a:pPr marL="722312" indent="-722312">
+          <a:lstStyle>
+            <a:lvl1pPr marL="611187" marR="0" indent="-611187" algn="l" defTabSz="821531" rtl="0" latinLnBrk="0">
+              <a:lnSpc>
+                <a:spcPct val="150000"/>
+              </a:lnSpc>
+              <a:spcBef>
+                <a:spcPts val="5900"/>
+              </a:spcBef>
+              <a:spcAft>
+                <a:spcPts val="0"/>
+              </a:spcAft>
+              <a:buClrTx/>
+              <a:buSzPct val="145000"/>
+              <a:buFontTx/>
+              <a:buChar char="•"/>
+              <a:tabLst/>
+              <a:defRPr sz="5200" b="0" i="0" u="none" strike="noStrike" cap="none" spc="0" baseline="0">
+                <a:ln>
+                  <a:noFill/>
+                </a:ln>
+                <a:solidFill>
+                  <a:srgbClr val="000000"/>
+                </a:solidFill>
+                <a:uFillTx/>
+                <a:latin typeface="맑은 고딕" panose="020B0503020000020004" pitchFamily="50" charset="-127"/>
+                <a:ea typeface="맑은 고딕" panose="020B0503020000020004" pitchFamily="50" charset="-127"/>
+                <a:cs typeface="+mj-cs"/>
+                <a:sym typeface="NanumSquareR"/>
+              </a:defRPr>
+            </a:lvl1pPr>
+            <a:lvl2pPr marL="1166812" marR="0" indent="-722312" algn="l" defTabSz="821531" rtl="0" latinLnBrk="0">
+              <a:lnSpc>
+                <a:spcPct val="150000"/>
+              </a:lnSpc>
+              <a:spcBef>
+                <a:spcPts val="5900"/>
+              </a:spcBef>
+              <a:spcAft>
+                <a:spcPts val="0"/>
+              </a:spcAft>
+              <a:buClrTx/>
+              <a:buSzPct val="145000"/>
+              <a:buFontTx/>
+              <a:buChar char="•"/>
+              <a:tabLst/>
+              <a:defRPr sz="5200" b="0" i="0" u="none" strike="noStrike" cap="none" spc="0" baseline="0">
+                <a:ln>
+                  <a:noFill/>
+                </a:ln>
+                <a:solidFill>
+                  <a:srgbClr val="000000"/>
+                </a:solidFill>
+                <a:uFillTx/>
+                <a:latin typeface="맑은 고딕" panose="020B0503020000020004" pitchFamily="50" charset="-127"/>
+                <a:ea typeface="맑은 고딕" panose="020B0503020000020004" pitchFamily="50" charset="-127"/>
+                <a:cs typeface="+mj-cs"/>
+                <a:sym typeface="NanumSquareR"/>
+              </a:defRPr>
+            </a:lvl2pPr>
+            <a:lvl3pPr marL="1611312" marR="0" indent="-722312" algn="l" defTabSz="821531" rtl="0" latinLnBrk="0">
+              <a:lnSpc>
+                <a:spcPct val="150000"/>
+              </a:lnSpc>
+              <a:spcBef>
+                <a:spcPts val="5900"/>
+              </a:spcBef>
+              <a:spcAft>
+                <a:spcPts val="0"/>
+              </a:spcAft>
+              <a:buClrTx/>
+              <a:buSzPct val="145000"/>
+              <a:buFontTx/>
+              <a:buChar char="•"/>
+              <a:tabLst/>
+              <a:defRPr sz="5200" b="0" i="0" u="none" strike="noStrike" cap="none" spc="0" baseline="0">
+                <a:ln>
+                  <a:noFill/>
+                </a:ln>
+                <a:solidFill>
+                  <a:srgbClr val="000000"/>
+                </a:solidFill>
+                <a:uFillTx/>
+                <a:latin typeface="맑은 고딕" panose="020B0503020000020004" pitchFamily="50" charset="-127"/>
+                <a:ea typeface="맑은 고딕" panose="020B0503020000020004" pitchFamily="50" charset="-127"/>
+                <a:cs typeface="+mj-cs"/>
+                <a:sym typeface="NanumSquareR"/>
+              </a:defRPr>
+            </a:lvl3pPr>
+            <a:lvl4pPr marL="2055812" marR="0" indent="-722312" algn="l" defTabSz="821531" rtl="0" latinLnBrk="0">
+              <a:lnSpc>
+                <a:spcPct val="150000"/>
+              </a:lnSpc>
+              <a:spcBef>
+                <a:spcPts val="5900"/>
+              </a:spcBef>
+              <a:spcAft>
+                <a:spcPts val="0"/>
+              </a:spcAft>
+              <a:buClrTx/>
+              <a:buSzPct val="145000"/>
+              <a:buFontTx/>
+              <a:buChar char="•"/>
+              <a:tabLst/>
+              <a:defRPr sz="5200" b="0" i="0" u="none" strike="noStrike" cap="none" spc="0" baseline="0">
+                <a:ln>
+                  <a:noFill/>
+                </a:ln>
+                <a:solidFill>
+                  <a:srgbClr val="000000"/>
+                </a:solidFill>
+                <a:uFillTx/>
+                <a:latin typeface="맑은 고딕" panose="020B0503020000020004" pitchFamily="50" charset="-127"/>
+                <a:ea typeface="맑은 고딕" panose="020B0503020000020004" pitchFamily="50" charset="-127"/>
+                <a:cs typeface="+mj-cs"/>
+                <a:sym typeface="NanumSquareR"/>
+              </a:defRPr>
+            </a:lvl4pPr>
+            <a:lvl5pPr marL="2500312" marR="0" indent="-722312" algn="l" defTabSz="821531" rtl="0" latinLnBrk="0">
+              <a:lnSpc>
+                <a:spcPct val="150000"/>
+              </a:lnSpc>
+              <a:spcBef>
+                <a:spcPts val="5900"/>
+              </a:spcBef>
+              <a:spcAft>
+                <a:spcPts val="0"/>
+              </a:spcAft>
+              <a:buClrTx/>
+              <a:buSzPct val="145000"/>
+              <a:buFontTx/>
+              <a:buChar char="•"/>
+              <a:tabLst/>
+              <a:defRPr sz="5200" b="0" i="0" u="none" strike="noStrike" cap="none" spc="0" baseline="0">
+                <a:ln>
+                  <a:noFill/>
+                </a:ln>
+                <a:solidFill>
+                  <a:srgbClr val="000000"/>
+                </a:solidFill>
+                <a:uFillTx/>
+                <a:latin typeface="맑은 고딕" panose="020B0503020000020004" pitchFamily="50" charset="-127"/>
+                <a:ea typeface="맑은 고딕" panose="020B0503020000020004" pitchFamily="50" charset="-127"/>
+                <a:cs typeface="+mj-cs"/>
+                <a:sym typeface="NanumSquareR"/>
+              </a:defRPr>
+            </a:lvl5pPr>
+            <a:lvl6pPr marL="2944812" marR="0" indent="-722312" algn="l" defTabSz="821531" rtl="0" latinLnBrk="0">
+              <a:lnSpc>
+                <a:spcPct val="150000"/>
+              </a:lnSpc>
+              <a:spcBef>
+                <a:spcPts val="5900"/>
+              </a:spcBef>
+              <a:spcAft>
+                <a:spcPts val="0"/>
+              </a:spcAft>
+              <a:buClrTx/>
+              <a:buSzPct val="145000"/>
+              <a:buFontTx/>
+              <a:buChar char="•"/>
+              <a:tabLst/>
+              <a:defRPr sz="5200" b="0" i="0" u="none" strike="noStrike" cap="none" spc="0" baseline="0">
+                <a:ln>
+                  <a:noFill/>
+                </a:ln>
+                <a:solidFill>
+                  <a:srgbClr val="000000"/>
+                </a:solidFill>
+                <a:uFillTx/>
+                <a:latin typeface="+mj-lt"/>
+                <a:ea typeface="+mj-ea"/>
+                <a:cs typeface="+mj-cs"/>
+                <a:sym typeface="NanumSquareR"/>
+              </a:defRPr>
+            </a:lvl6pPr>
+            <a:lvl7pPr marL="3389312" marR="0" indent="-722312" algn="l" defTabSz="821531" rtl="0" latinLnBrk="0">
+              <a:lnSpc>
+                <a:spcPct val="150000"/>
+              </a:lnSpc>
+              <a:spcBef>
+                <a:spcPts val="5900"/>
+              </a:spcBef>
+              <a:spcAft>
+                <a:spcPts val="0"/>
+              </a:spcAft>
+              <a:buClrTx/>
+              <a:buSzPct val="145000"/>
+              <a:buFontTx/>
+              <a:buChar char="•"/>
+              <a:tabLst/>
+              <a:defRPr sz="5200" b="0" i="0" u="none" strike="noStrike" cap="none" spc="0" baseline="0">
+                <a:ln>
+                  <a:noFill/>
+                </a:ln>
+                <a:solidFill>
+                  <a:srgbClr val="000000"/>
+                </a:solidFill>
+                <a:uFillTx/>
+                <a:latin typeface="+mj-lt"/>
+                <a:ea typeface="+mj-ea"/>
+                <a:cs typeface="+mj-cs"/>
+                <a:sym typeface="NanumSquareR"/>
+              </a:defRPr>
+            </a:lvl7pPr>
+            <a:lvl8pPr marL="3833812" marR="0" indent="-722312" algn="l" defTabSz="821531" rtl="0" latinLnBrk="0">
+              <a:lnSpc>
+                <a:spcPct val="150000"/>
+              </a:lnSpc>
+              <a:spcBef>
+                <a:spcPts val="5900"/>
+              </a:spcBef>
+              <a:spcAft>
+                <a:spcPts val="0"/>
+              </a:spcAft>
+              <a:buClrTx/>
+              <a:buSzPct val="145000"/>
+              <a:buFontTx/>
+              <a:buChar char="•"/>
+              <a:tabLst/>
+              <a:defRPr sz="5200" b="0" i="0" u="none" strike="noStrike" cap="none" spc="0" baseline="0">
+                <a:ln>
+                  <a:noFill/>
+                </a:ln>
+                <a:solidFill>
+                  <a:srgbClr val="000000"/>
+                </a:solidFill>
+                <a:uFillTx/>
+                <a:latin typeface="+mj-lt"/>
+                <a:ea typeface="+mj-ea"/>
+                <a:cs typeface="+mj-cs"/>
+                <a:sym typeface="NanumSquareR"/>
+              </a:defRPr>
+            </a:lvl8pPr>
+            <a:lvl9pPr marL="4278312" marR="0" indent="-722312" algn="l" defTabSz="821531" rtl="0" latinLnBrk="0">
+              <a:lnSpc>
+                <a:spcPct val="150000"/>
+              </a:lnSpc>
+              <a:spcBef>
+                <a:spcPts val="5900"/>
+              </a:spcBef>
+              <a:spcAft>
+                <a:spcPts val="0"/>
+              </a:spcAft>
+              <a:buClrTx/>
+              <a:buSzPct val="145000"/>
+              <a:buFontTx/>
+              <a:buChar char="•"/>
+              <a:tabLst/>
+              <a:defRPr sz="5200" b="0" i="0" u="none" strike="noStrike" cap="none" spc="0" baseline="0">
+                <a:ln>
+                  <a:noFill/>
+                </a:ln>
+                <a:solidFill>
+                  <a:srgbClr val="000000"/>
+                </a:solidFill>
+                <a:uFillTx/>
+                <a:latin typeface="+mj-lt"/>
+                <a:ea typeface="+mj-ea"/>
+                <a:cs typeface="+mj-cs"/>
+                <a:sym typeface="NanumSquareR"/>
+              </a:defRPr>
+            </a:lvl9pPr>
+          </a:lstStyle>
+          <a:p>
+            <a:pPr marL="722312" indent="-722312" hangingPunct="1">
               <a:buSzPct val="50000"/>
               <a:buBlip>
-                <a:blip r:embed="rId5">
-                  <a:extLst/>
-                </a:blip>
+                <a:blip r:embed="rId5"/>
               </a:buBlip>
             </a:pPr>
             <a:r>
@@ -8644,20 +8591,14 @@
                 <a:latin typeface="나눔스퀘어" panose="020B0600000101010101" pitchFamily="50" charset="-127"/>
                 <a:ea typeface="나눔스퀘어" panose="020B0600000101010101" pitchFamily="50" charset="-127"/>
               </a:rPr>
-              <a:t>치아 모델을 기존 앱에 삽입</a:t>
-            </a:r>
-            <a:endParaRPr lang="en-US" altLang="ko-KR" dirty="0">
-              <a:latin typeface="나눔스퀘어" panose="020B0600000101010101" pitchFamily="50" charset="-127"/>
-              <a:ea typeface="나눔스퀘어" panose="020B0600000101010101" pitchFamily="50" charset="-127"/>
-            </a:endParaRPr>
-          </a:p>
-          <a:p>
-            <a:pPr marL="722312" indent="-722312">
+              <a:t>치아 모델을 애플리케이션에 삽입</a:t>
+            </a:r>
+          </a:p>
+          <a:p>
+            <a:pPr marL="722312" indent="-722312" hangingPunct="1">
               <a:buSzPct val="50000"/>
               <a:buBlip>
-                <a:blip r:embed="rId5">
-                  <a:extLst/>
-                </a:blip>
+                <a:blip r:embed="rId5"/>
               </a:buBlip>
             </a:pPr>
             <a:r>
@@ -8665,20 +8606,14 @@
                 <a:latin typeface="나눔스퀘어" panose="020B0600000101010101" pitchFamily="50" charset="-127"/>
                 <a:ea typeface="나눔스퀘어" panose="020B0600000101010101" pitchFamily="50" charset="-127"/>
               </a:rPr>
-              <a:t>치아 하이라이트 제대로 작동 안함</a:t>
-            </a:r>
-            <a:endParaRPr lang="en-US" altLang="ko-KR" dirty="0">
-              <a:latin typeface="나눔스퀘어" panose="020B0600000101010101" pitchFamily="50" charset="-127"/>
-              <a:ea typeface="나눔스퀘어" panose="020B0600000101010101" pitchFamily="50" charset="-127"/>
-            </a:endParaRPr>
-          </a:p>
-          <a:p>
-            <a:pPr marL="722312" indent="-722312">
+              <a:t>치아 하이라이트 기능 구현 방법 모색</a:t>
+            </a:r>
+          </a:p>
+          <a:p>
+            <a:pPr marL="722312" indent="-722312" hangingPunct="1">
               <a:buSzPct val="50000"/>
               <a:buBlip>
-                <a:blip r:embed="rId5">
-                  <a:extLst/>
-                </a:blip>
+                <a:blip r:embed="rId5"/>
               </a:buBlip>
             </a:pPr>
             <a:r>
@@ -8686,7 +8621,7 @@
                 <a:latin typeface="나눔스퀘어" panose="020B0600000101010101" pitchFamily="50" charset="-127"/>
                 <a:ea typeface="나눔스퀘어" panose="020B0600000101010101" pitchFamily="50" charset="-127"/>
               </a:rPr>
-              <a:t>모델의 문제인지 앱에 나타내는 과정이 문제인지 파악 중</a:t>
+              <a:t>치아 하이라이트 문제</a:t>
             </a:r>
           </a:p>
         </p:txBody>
@@ -8705,7 +8640,7 @@
 </p:sld>
 </file>
 
-<file path=ppt/slides/slide18.xml><?xml version="1.0" encoding="utf-8"?>
+<file path=ppt/slides/slide17.xml><?xml version="1.0" encoding="utf-8"?>
 <p:sld xmlns:a="http://schemas.openxmlformats.org/drawingml/2006/main" xmlns:r="http://schemas.openxmlformats.org/officeDocument/2006/relationships" xmlns:p="http://schemas.openxmlformats.org/presentationml/2006/main">
   <p:cSld>
     <p:bg>

</xml_diff>

<commit_message>
Made minor changes to PPT and SPEC
</commit_message>
<xml_diff>
--- a/PPT/캡스톤디자인_5주차 발표자료_5조.pptx
+++ b/PPT/캡스톤디자인_5주차 발표자료_5조.pptx
@@ -30,13 +30,13 @@
   <p:notesSz cx="6858000" cy="9144000"/>
   <p:embeddedFontLst>
     <p:embeddedFont>
-      <p:font typeface="맑은 고딕" panose="020B0503020000020004" pitchFamily="50" charset="-127"/>
+      <p:font typeface="나눔스퀘어" panose="020B0600000101010101" pitchFamily="50" charset="-127"/>
       <p:regular r:id="rId20"/>
-      <p:bold r:id="rId21"/>
     </p:embeddedFont>
     <p:embeddedFont>
-      <p:font typeface="나눔스퀘어" panose="020B0600000101010101" pitchFamily="50" charset="-127"/>
-      <p:regular r:id="rId22"/>
+      <p:font typeface="맑은 고딕" panose="020B0503020000020004" pitchFamily="50" charset="-127"/>
+      <p:regular r:id="rId21"/>
+      <p:bold r:id="rId22"/>
     </p:embeddedFont>
   </p:embeddedFontLst>
   <p:defaultTextStyle>
@@ -5843,7 +5843,13 @@
           <p:nvPr/>
         </p:nvPicPr>
         <p:blipFill>
-          <a:blip r:embed="rId3"/>
+          <a:blip r:embed="rId3">
+            <a:extLst>
+              <a:ext uri="{28A0092B-C50C-407E-A947-70E740481C1C}">
+                <a14:useLocalDpi xmlns:a14="http://schemas.microsoft.com/office/drawing/2010/main" val="0"/>
+              </a:ext>
+            </a:extLst>
+          </a:blip>
           <a:stretch>
             <a:fillRect/>
           </a:stretch>
@@ -5851,7 +5857,7 @@
         <p:spPr>
           <a:xfrm>
             <a:off x="2650136" y="3335464"/>
-            <a:ext cx="4581535" cy="9417599"/>
+            <a:ext cx="4581534" cy="9417599"/>
           </a:xfrm>
           <a:prstGeom prst="rect">
             <a:avLst/>
@@ -6176,7 +6182,7 @@
                 <a:ea typeface="나눔스퀘어" panose="020B0600000101010101" pitchFamily="50" charset="-127"/>
                 <a:sym typeface="Helvetica Neue Medium"/>
               </a:rPr>
-              <a:t>하단에는 일별 양치습관과 그에 대한 코멘트 출력</a:t>
+              <a:t>하단에는 일별 양치기록과 그에 대한 코멘트 출력</a:t>
             </a:r>
           </a:p>
         </p:txBody>
@@ -7354,7 +7360,13 @@
           <p:nvPr/>
         </p:nvPicPr>
         <p:blipFill>
-          <a:blip r:embed="rId3"/>
+          <a:blip r:embed="rId3">
+            <a:extLst>
+              <a:ext uri="{28A0092B-C50C-407E-A947-70E740481C1C}">
+                <a14:useLocalDpi xmlns:a14="http://schemas.microsoft.com/office/drawing/2010/main" val="0"/>
+              </a:ext>
+            </a:extLst>
+          </a:blip>
           <a:stretch>
             <a:fillRect/>
           </a:stretch>
@@ -7362,7 +7374,7 @@
         <p:spPr>
           <a:xfrm>
             <a:off x="2681886" y="3345156"/>
-            <a:ext cx="4581535" cy="9417600"/>
+            <a:ext cx="4581535" cy="9417599"/>
           </a:xfrm>
           <a:prstGeom prst="rect">
             <a:avLst/>
@@ -8020,15 +8032,21 @@
           <p:nvPr/>
         </p:nvPicPr>
         <p:blipFill>
-          <a:blip r:embed="rId3"/>
+          <a:blip r:embed="rId3">
+            <a:extLst>
+              <a:ext uri="{28A0092B-C50C-407E-A947-70E740481C1C}">
+                <a14:useLocalDpi xmlns:a14="http://schemas.microsoft.com/office/drawing/2010/main" val="0"/>
+              </a:ext>
+            </a:extLst>
+          </a:blip>
           <a:stretch>
             <a:fillRect/>
           </a:stretch>
         </p:blipFill>
         <p:spPr>
           <a:xfrm>
-            <a:off x="2664043" y="3326486"/>
-            <a:ext cx="4581535" cy="9418145"/>
+            <a:off x="2664043" y="3326759"/>
+            <a:ext cx="4581535" cy="9417599"/>
           </a:xfrm>
           <a:prstGeom prst="rect">
             <a:avLst/>
@@ -8187,100 +8205,6 @@
           </a:p>
         </p:txBody>
       </p:sp>
-      <p:pic>
-        <p:nvPicPr>
-          <p:cNvPr id="6" name="그림 5">
-            <a:extLst>
-              <a:ext uri="{FF2B5EF4-FFF2-40B4-BE49-F238E27FC236}">
-                <a16:creationId xmlns:a16="http://schemas.microsoft.com/office/drawing/2014/main" id="{7C275E26-0FF2-44B5-B11C-4B7307449340}"/>
-              </a:ext>
-            </a:extLst>
-          </p:cNvPr>
-          <p:cNvPicPr>
-            <a:picLocks noChangeAspect="1"/>
-          </p:cNvPicPr>
-          <p:nvPr/>
-        </p:nvPicPr>
-        <p:blipFill rotWithShape="1">
-          <a:blip r:embed="rId3">
-            <a:extLst>
-              <a:ext uri="{28A0092B-C50C-407E-A947-70E740481C1C}">
-                <a14:useLocalDpi xmlns:a14="http://schemas.microsoft.com/office/drawing/2010/main" val="0"/>
-              </a:ext>
-            </a:extLst>
-          </a:blip>
-          <a:srcRect l="5786" r="5550"/>
-          <a:stretch/>
-        </p:blipFill>
-        <p:spPr>
-          <a:xfrm>
-            <a:off x="1407002" y="3393280"/>
-            <a:ext cx="4851448" cy="9607760"/>
-          </a:xfrm>
-          <a:prstGeom prst="rect">
-            <a:avLst/>
-          </a:prstGeom>
-        </p:spPr>
-      </p:pic>
-      <p:pic>
-        <p:nvPicPr>
-          <p:cNvPr id="8" name="그림 7">
-            <a:extLst>
-              <a:ext uri="{FF2B5EF4-FFF2-40B4-BE49-F238E27FC236}">
-                <a16:creationId xmlns:a16="http://schemas.microsoft.com/office/drawing/2014/main" id="{BF1261C6-7596-4C37-9EA0-663592652661}"/>
-              </a:ext>
-            </a:extLst>
-          </p:cNvPr>
-          <p:cNvPicPr>
-            <a:picLocks noChangeAspect="1"/>
-          </p:cNvPicPr>
-          <p:nvPr/>
-        </p:nvPicPr>
-        <p:blipFill rotWithShape="1">
-          <a:blip r:embed="rId4">
-            <a:extLst>
-              <a:ext uri="{28A0092B-C50C-407E-A947-70E740481C1C}">
-                <a14:useLocalDpi xmlns:a14="http://schemas.microsoft.com/office/drawing/2010/main" val="0"/>
-              </a:ext>
-            </a:extLst>
-          </a:blip>
-          <a:srcRect l="5576" r="5760"/>
-          <a:stretch/>
-        </p:blipFill>
-        <p:spPr>
-          <a:xfrm>
-            <a:off x="18125552" y="3393280"/>
-            <a:ext cx="4851448" cy="9607758"/>
-          </a:xfrm>
-          <a:prstGeom prst="ellipse">
-            <a:avLst/>
-          </a:prstGeom>
-          <a:ln w="63500" cap="rnd">
-            <a:solidFill>
-              <a:srgbClr val="333333"/>
-            </a:solidFill>
-          </a:ln>
-          <a:effectLst>
-            <a:outerShdw blurRad="381000" dist="292100" dir="5400000" sx="-80000" sy="-18000" rotWithShape="0">
-              <a:srgbClr val="000000">
-                <a:alpha val="22000"/>
-              </a:srgbClr>
-            </a:outerShdw>
-          </a:effectLst>
-          <a:scene3d>
-            <a:camera prst="orthographicFront"/>
-            <a:lightRig rig="contrasting" dir="t">
-              <a:rot lat="0" lon="0" rev="3000000"/>
-            </a:lightRig>
-          </a:scene3d>
-          <a:sp3d contourW="7620">
-            <a:bevelT w="95250" h="31750"/>
-            <a:contourClr>
-              <a:srgbClr val="333333"/>
-            </a:contourClr>
-          </a:sp3d>
-        </p:spPr>
-      </p:pic>
       <p:sp>
         <p:nvSpPr>
           <p:cNvPr id="7" name="다양한 스마트 헬스케어 제품 출시…">
@@ -8297,8 +8221,8 @@
         </p:nvSpPr>
         <p:spPr>
           <a:xfrm>
-            <a:off x="7367904" y="3643312"/>
-            <a:ext cx="15609094" cy="7666371"/>
+            <a:off x="9344722" y="3643312"/>
+            <a:ext cx="13632276" cy="7666371"/>
           </a:xfrm>
           <a:prstGeom prst="rect">
             <a:avLst/>
@@ -8583,7 +8507,7 @@
             <a:pPr marL="722312" indent="-722312" hangingPunct="1">
               <a:buSzPct val="50000"/>
               <a:buBlip>
-                <a:blip r:embed="rId5"/>
+                <a:blip r:embed="rId3"/>
               </a:buBlip>
             </a:pPr>
             <a:r>
@@ -8598,7 +8522,7 @@
             <a:pPr marL="722312" indent="-722312" hangingPunct="1">
               <a:buSzPct val="50000"/>
               <a:buBlip>
-                <a:blip r:embed="rId5"/>
+                <a:blip r:embed="rId3"/>
               </a:buBlip>
             </a:pPr>
             <a:r>
@@ -8613,7 +8537,7 @@
             <a:pPr marL="722312" indent="-722312" hangingPunct="1">
               <a:buSzPct val="50000"/>
               <a:buBlip>
-                <a:blip r:embed="rId5"/>
+                <a:blip r:embed="rId3"/>
               </a:buBlip>
             </a:pPr>
             <a:r>
@@ -8626,6 +8550,71 @@
           </a:p>
         </p:txBody>
       </p:sp>
+      <p:pic>
+        <p:nvPicPr>
+          <p:cNvPr id="2" name="그림 1">
+            <a:extLst>
+              <a:ext uri="{FF2B5EF4-FFF2-40B4-BE49-F238E27FC236}">
+                <a16:creationId xmlns:a16="http://schemas.microsoft.com/office/drawing/2014/main" id="{58CEFEA9-F9C4-455D-B6D2-9E717CB26892}"/>
+              </a:ext>
+            </a:extLst>
+          </p:cNvPr>
+          <p:cNvPicPr>
+            <a:picLocks noChangeAspect="1"/>
+          </p:cNvPicPr>
+          <p:nvPr/>
+        </p:nvPicPr>
+        <p:blipFill rotWithShape="1">
+          <a:blip r:embed="rId4"/>
+          <a:srcRect l="9555" t="7891" r="11226" b="11584"/>
+          <a:stretch/>
+        </p:blipFill>
+        <p:spPr>
+          <a:xfrm>
+            <a:off x="5101132" y="4331853"/>
+            <a:ext cx="3523785" cy="6289287"/>
+          </a:xfrm>
+          <a:prstGeom prst="rect">
+            <a:avLst/>
+          </a:prstGeom>
+        </p:spPr>
+      </p:pic>
+      <p:pic>
+        <p:nvPicPr>
+          <p:cNvPr id="11" name="그림 10">
+            <a:extLst>
+              <a:ext uri="{FF2B5EF4-FFF2-40B4-BE49-F238E27FC236}">
+                <a16:creationId xmlns:a16="http://schemas.microsoft.com/office/drawing/2014/main" id="{C84CC23A-77D5-44B1-82F8-C92604E1E02C}"/>
+              </a:ext>
+            </a:extLst>
+          </p:cNvPr>
+          <p:cNvPicPr>
+            <a:picLocks noChangeAspect="1"/>
+          </p:cNvPicPr>
+          <p:nvPr/>
+        </p:nvPicPr>
+        <p:blipFill>
+          <a:blip r:embed="rId5">
+            <a:extLst>
+              <a:ext uri="{28A0092B-C50C-407E-A947-70E740481C1C}">
+                <a14:useLocalDpi xmlns:a14="http://schemas.microsoft.com/office/drawing/2010/main" val="0"/>
+              </a:ext>
+            </a:extLst>
+          </a:blip>
+          <a:stretch>
+            <a:fillRect/>
+          </a:stretch>
+        </p:blipFill>
+        <p:spPr>
+          <a:xfrm>
+            <a:off x="1407002" y="4335634"/>
+            <a:ext cx="3523785" cy="6285506"/>
+          </a:xfrm>
+          <a:prstGeom prst="rect">
+            <a:avLst/>
+          </a:prstGeom>
+        </p:spPr>
+      </p:pic>
     </p:spTree>
     <p:extLst>
       <p:ext uri="{BB962C8B-B14F-4D97-AF65-F5344CB8AC3E}">
@@ -9049,36 +9038,6 @@
           </a:p>
         </p:txBody>
       </p:sp>
-      <p:pic>
-        <p:nvPicPr>
-          <p:cNvPr id="2" name="그림 1">
-            <a:extLst>
-              <a:ext uri="{FF2B5EF4-FFF2-40B4-BE49-F238E27FC236}">
-                <a16:creationId xmlns:a16="http://schemas.microsoft.com/office/drawing/2014/main" id="{919BC046-F6C2-45CF-B9AB-818E5C287E94}"/>
-              </a:ext>
-            </a:extLst>
-          </p:cNvPr>
-          <p:cNvPicPr>
-            <a:picLocks noChangeAspect="1"/>
-          </p:cNvPicPr>
-          <p:nvPr/>
-        </p:nvPicPr>
-        <p:blipFill>
-          <a:blip r:embed="rId3"/>
-          <a:stretch>
-            <a:fillRect/>
-          </a:stretch>
-        </p:blipFill>
-        <p:spPr>
-          <a:xfrm>
-            <a:off x="5772407" y="3393282"/>
-            <a:ext cx="12839185" cy="9694562"/>
-          </a:xfrm>
-          <a:prstGeom prst="rect">
-            <a:avLst/>
-          </a:prstGeom>
-        </p:spPr>
-      </p:pic>
     </p:spTree>
   </p:cSld>
   <p:clrMapOvr>

</xml_diff>